<commit_message>
replace = by -> for more readability
suggested by fred
</commit_message>
<xml_diff>
--- a/KernelDeveloperGuide/png/kf_spec/context_local_storage.pptx
+++ b/KernelDeveloperGuide/png/kf_spec/context_local_storage.pptx
@@ -1884,7 +1884,7 @@
                 <a:latin typeface="Calibri Light"/>
                 <a:ea typeface="Calibri Regular"/>
               </a:rPr>
-              <a:t>21-Feb-19</a:t>
+              <a:t>1/15/2025</a:t>
             </a:fld>
             <a:endParaRPr lang="en-US" sz="1000" b="0" strike="noStrike" spc="-1">
               <a:solidFill>
@@ -4503,7 +4503,7 @@
         <p:spPr>
           <a:xfrm>
             <a:off x="3780000" y="1412640"/>
-            <a:ext cx="1645560" cy="3744000"/>
+            <a:ext cx="1661400" cy="3744000"/>
           </a:xfrm>
           <a:prstGeom prst="roundRect">
             <a:avLst>
@@ -5176,7 +5176,7 @@
         <p:spPr>
           <a:xfrm>
             <a:off x="1735560" y="1985040"/>
-            <a:ext cx="5751720" cy="2831400"/>
+            <a:ext cx="5881392" cy="2831400"/>
           </a:xfrm>
           <a:prstGeom prst="rect">
             <a:avLst/>
@@ -5265,7 +5265,7 @@
                 </a:uFill>
                 <a:latin typeface="Consolas"/>
               </a:rPr>
-              <a:t>() = 1</a:t>
+              <a:t>() -&gt; 1</a:t>
             </a:r>
             <a:endParaRPr lang="en-US" sz="1000" b="0" strike="noStrike" spc="-1" dirty="0">
               <a:solidFill>
@@ -5379,7 +5379,7 @@
                 </a:uFill>
                 <a:latin typeface="Consolas"/>
               </a:rPr>
-              <a:t>()  = 1</a:t>
+              <a:t>()  -&gt; 1</a:t>
             </a:r>
             <a:endParaRPr lang="en-US" sz="1000" b="0" strike="noStrike" spc="-1" dirty="0">
               <a:solidFill>
@@ -5439,7 +5439,7 @@
                 </a:uFill>
                 <a:latin typeface="Consolas"/>
               </a:rPr>
-              <a:t>() = 1		   </a:t>
+              <a:t>() -&gt; 1		   </a:t>
             </a:r>
             <a:endParaRPr lang="en-US" sz="1000" b="0" strike="noStrike" spc="-1" dirty="0">
               <a:solidFill>
@@ -5499,7 +5499,7 @@
                 </a:uFill>
                 <a:latin typeface="Consolas"/>
               </a:rPr>
-              <a:t>()  = 1</a:t>
+              <a:t>()  -&gt; 1</a:t>
             </a:r>
             <a:endParaRPr lang="en-US" sz="1000" b="0" strike="noStrike" spc="-1" dirty="0">
               <a:solidFill>
@@ -5559,7 +5559,7 @@
                 </a:uFill>
                 <a:latin typeface="Consolas"/>
               </a:rPr>
-              <a:t>()  = 1</a:t>
+              <a:t>() -&gt; 1</a:t>
             </a:r>
             <a:endParaRPr lang="en-US" sz="1000" b="0" strike="noStrike" spc="-1" dirty="0">
               <a:solidFill>
@@ -5619,7 +5619,7 @@
                 </a:uFill>
                 <a:latin typeface="Consolas"/>
               </a:rPr>
-              <a:t>() = 2</a:t>
+              <a:t>() -&gt; 2</a:t>
             </a:r>
             <a:endParaRPr lang="en-US" sz="1000" b="0" strike="noStrike" spc="-1" dirty="0">
               <a:solidFill>
@@ -5733,7 +5733,7 @@
                 </a:uFill>
                 <a:latin typeface="Consolas"/>
               </a:rPr>
-              <a:t>() = 2</a:t>
+              <a:t>() -&gt; 2</a:t>
             </a:r>
             <a:endParaRPr lang="en-US" sz="1000" b="0" strike="noStrike" spc="-1" dirty="0">
               <a:solidFill>
@@ -5843,7 +5843,7 @@
                 </a:uFill>
                 <a:latin typeface="Consolas"/>
               </a:rPr>
-              <a:t>() = 3</a:t>
+              <a:t>() -&gt; 3</a:t>
             </a:r>
             <a:endParaRPr lang="en-US" sz="1000" b="0" strike="noStrike" spc="-1" dirty="0">
               <a:solidFill>

</xml_diff>